<commit_message>
Updated QR code assets
</commit_message>
<xml_diff>
--- a/SeasonOfAI/SeasonOfAI-AttendeeSurveyQR-Slide.pptx
+++ b/SeasonOfAI/SeasonOfAI-AttendeeSurveyQR-Slide.pptx
@@ -267,7 +267,7 @@
           <a:p>
             <a:fld id="{64C41B8D-EF06-49EC-8D6D-D79E35A3A61C}" type="datetimeFigureOut">
               <a:rPr lang="en-US" smtClean="0"/>
-              <a:t>4/15/24</a:t>
+              <a:t>4/27/24</a:t>
             </a:fld>
             <a:endParaRPr lang="en-US"/>
           </a:p>
@@ -465,7 +465,7 @@
           <a:p>
             <a:fld id="{64C41B8D-EF06-49EC-8D6D-D79E35A3A61C}" type="datetimeFigureOut">
               <a:rPr lang="en-US" smtClean="0"/>
-              <a:t>4/15/24</a:t>
+              <a:t>4/27/24</a:t>
             </a:fld>
             <a:endParaRPr lang="en-US"/>
           </a:p>
@@ -673,7 +673,7 @@
           <a:p>
             <a:fld id="{64C41B8D-EF06-49EC-8D6D-D79E35A3A61C}" type="datetimeFigureOut">
               <a:rPr lang="en-US" smtClean="0"/>
-              <a:t>4/15/24</a:t>
+              <a:t>4/27/24</a:t>
             </a:fld>
             <a:endParaRPr lang="en-US"/>
           </a:p>
@@ -871,7 +871,7 @@
           <a:p>
             <a:fld id="{64C41B8D-EF06-49EC-8D6D-D79E35A3A61C}" type="datetimeFigureOut">
               <a:rPr lang="en-US" smtClean="0"/>
-              <a:t>4/15/24</a:t>
+              <a:t>4/27/24</a:t>
             </a:fld>
             <a:endParaRPr lang="en-US"/>
           </a:p>
@@ -1146,7 +1146,7 @@
           <a:p>
             <a:fld id="{64C41B8D-EF06-49EC-8D6D-D79E35A3A61C}" type="datetimeFigureOut">
               <a:rPr lang="en-US" smtClean="0"/>
-              <a:t>4/15/24</a:t>
+              <a:t>4/27/24</a:t>
             </a:fld>
             <a:endParaRPr lang="en-US"/>
           </a:p>
@@ -1411,7 +1411,7 @@
           <a:p>
             <a:fld id="{64C41B8D-EF06-49EC-8D6D-D79E35A3A61C}" type="datetimeFigureOut">
               <a:rPr lang="en-US" smtClean="0"/>
-              <a:t>4/15/24</a:t>
+              <a:t>4/27/24</a:t>
             </a:fld>
             <a:endParaRPr lang="en-US"/>
           </a:p>
@@ -1823,7 +1823,7 @@
           <a:p>
             <a:fld id="{64C41B8D-EF06-49EC-8D6D-D79E35A3A61C}" type="datetimeFigureOut">
               <a:rPr lang="en-US" smtClean="0"/>
-              <a:t>4/15/24</a:t>
+              <a:t>4/27/24</a:t>
             </a:fld>
             <a:endParaRPr lang="en-US"/>
           </a:p>
@@ -1964,7 +1964,7 @@
           <a:p>
             <a:fld id="{64C41B8D-EF06-49EC-8D6D-D79E35A3A61C}" type="datetimeFigureOut">
               <a:rPr lang="en-US" smtClean="0"/>
-              <a:t>4/15/24</a:t>
+              <a:t>4/27/24</a:t>
             </a:fld>
             <a:endParaRPr lang="en-US"/>
           </a:p>
@@ -2077,7 +2077,7 @@
           <a:p>
             <a:fld id="{64C41B8D-EF06-49EC-8D6D-D79E35A3A61C}" type="datetimeFigureOut">
               <a:rPr lang="en-US" smtClean="0"/>
-              <a:t>4/15/24</a:t>
+              <a:t>4/27/24</a:t>
             </a:fld>
             <a:endParaRPr lang="en-US"/>
           </a:p>
@@ -2388,7 +2388,7 @@
           <a:p>
             <a:fld id="{64C41B8D-EF06-49EC-8D6D-D79E35A3A61C}" type="datetimeFigureOut">
               <a:rPr lang="en-US" smtClean="0"/>
-              <a:t>4/15/24</a:t>
+              <a:t>4/27/24</a:t>
             </a:fld>
             <a:endParaRPr lang="en-US"/>
           </a:p>
@@ -2676,7 +2676,7 @@
           <a:p>
             <a:fld id="{64C41B8D-EF06-49EC-8D6D-D79E35A3A61C}" type="datetimeFigureOut">
               <a:rPr lang="en-US" smtClean="0"/>
-              <a:t>4/15/24</a:t>
+              <a:t>4/27/24</a:t>
             </a:fld>
             <a:endParaRPr lang="en-US"/>
           </a:p>
@@ -2917,7 +2917,7 @@
           <a:p>
             <a:fld id="{64C41B8D-EF06-49EC-8D6D-D79E35A3A61C}" type="datetimeFigureOut">
               <a:rPr lang="en-US" smtClean="0"/>
-              <a:t>4/15/24</a:t>
+              <a:t>4/27/24</a:t>
             </a:fld>
             <a:endParaRPr lang="en-US"/>
           </a:p>
@@ -4338,7 +4338,7 @@
       </p:sp>
       <p:pic>
         <p:nvPicPr>
-          <p:cNvPr id="10" name="Picture 9" descr="A qr code with a colorful square and a square with text&#10;&#10;Description automatically generated">
+          <p:cNvPr id="10" name="Picture 9">
             <a:extLst>
               <a:ext uri="{FF2B5EF4-FFF2-40B4-BE49-F238E27FC236}">
                 <a16:creationId xmlns:a16="http://schemas.microsoft.com/office/drawing/2014/main" id="{D2F76D27-C1F4-F7BE-1188-AF9C9EE3D4A0}"/>
@@ -4358,14 +4358,13 @@
               </a:ext>
             </a:extLst>
           </a:blip>
-          <a:stretch>
-            <a:fillRect/>
-          </a:stretch>
+          <a:srcRect/>
+          <a:stretch/>
         </p:blipFill>
         <p:spPr>
           <a:xfrm>
-            <a:off x="1718427" y="732962"/>
-            <a:ext cx="3529433" cy="4115958"/>
+            <a:off x="1718688" y="732962"/>
+            <a:ext cx="3528911" cy="4115958"/>
           </a:xfrm>
           <a:prstGeom prst="rect">
             <a:avLst/>

</xml_diff>